<commit_message>
SBOL 3 -> SBOL3
</commit_message>
<xml_diff>
--- a/2022/IWBDA22/sbol3-workshop/pySBOL3-IWBDA-2022.pptx
+++ b/2022/IWBDA22/sbol3-workshop/pySBOL3-IWBDA-2022.pptx
@@ -12030,7 +12030,7 @@
           <a:p>
             <a:r>
               <a:rPr lang="en-US" dirty="0"/>
-              <a:t>pySBOL3 – A Python implementation of SBOL 3</a:t>
+              <a:t>pySBOL3 – A Python implementation of SBOL3</a:t>
             </a:r>
           </a:p>
         </p:txBody>
@@ -17423,7 +17423,7 @@
         <p:spPr>
           <a:xfrm>
             <a:off x="4112230" y="1277884"/>
-            <a:ext cx="983987" cy="369332"/>
+            <a:ext cx="928459" cy="369332"/>
           </a:xfrm>
           <a:prstGeom prst="rect">
             <a:avLst/>
@@ -17438,7 +17438,7 @@
           <a:p>
             <a:r>
               <a:rPr lang="en-US" dirty="0"/>
-              <a:t>SBOL 2</a:t>
+              <a:t>SBOL2</a:t>
             </a:r>
           </a:p>
         </p:txBody>
@@ -17458,7 +17458,7 @@
         <p:spPr>
           <a:xfrm>
             <a:off x="8757157" y="1279791"/>
-            <a:ext cx="983987" cy="369332"/>
+            <a:ext cx="928459" cy="369332"/>
           </a:xfrm>
           <a:prstGeom prst="rect">
             <a:avLst/>
@@ -17473,7 +17473,7 @@
           <a:p>
             <a:r>
               <a:rPr lang="en-US" dirty="0"/>
-              <a:t>SBOL 3</a:t>
+              <a:t>SBOL3</a:t>
             </a:r>
           </a:p>
         </p:txBody>
@@ -17548,51 +17548,38 @@
           <a:p>
             <a:r>
               <a:rPr lang="en-US" dirty="0"/>
-              <a:t>SBOL 3 is the newest iteration of The Synthetic Biology Open Language</a:t>
-            </a:r>
-          </a:p>
-          <a:p>
-            <a:pPr lvl="1"/>
+              <a:t>SBOL3 is the newest iteration of The Synthetic Biology Open Language</a:t>
+            </a:r>
+          </a:p>
+          <a:p>
+            <a:pPr lvl="2"/>
             <a:r>
               <a:rPr lang="en-US" dirty="0"/>
-              <a:t>3.0 released April 1, 2020</a:t>
-            </a:r>
-          </a:p>
-          <a:p>
-            <a:pPr lvl="1"/>
+              <a:t>3.0 was released on April 1, 2020</a:t>
+            </a:r>
+          </a:p>
+          <a:p>
+            <a:pPr lvl="2"/>
             <a:r>
               <a:rPr lang="en-US" dirty="0"/>
-              <a:t>3.0.1 released October 27, 2021</a:t>
-            </a:r>
-          </a:p>
-          <a:p>
-            <a:pPr lvl="1"/>
+              <a:t>3.0.1 was released on October 27, 2021</a:t>
+            </a:r>
+          </a:p>
+          <a:p>
+            <a:pPr lvl="2"/>
             <a:r>
               <a:rPr lang="en-US" dirty="0"/>
               <a:t>Follow along at https://github.com/SynBioDex/SBOL-specification</a:t>
             </a:r>
           </a:p>
           <a:p>
-            <a:pPr lvl="1"/>
             <a:endParaRPr lang="en-US" dirty="0"/>
           </a:p>
           <a:p>
-            <a:pPr lvl="1"/>
             <a:r>
               <a:rPr lang="en-US" dirty="0"/>
-              <a:t>pySBOL3 implements through the 3.0.1 specification</a:t>
-            </a:r>
-          </a:p>
-          <a:p>
-            <a:pPr lvl="1"/>
-            <a:endParaRPr lang="en-US" dirty="0"/>
-          </a:p>
-          <a:p>
-            <a:pPr lvl="1"/>
-            <a:endParaRPr lang="en-US" dirty="0"/>
-          </a:p>
-          <a:p>
-            <a:endParaRPr lang="en-US" dirty="0"/>
+              <a:t>pySBOL3 implements SBOL3 3.0.1 specification</a:t>
+            </a:r>
           </a:p>
           <a:p>
             <a:endParaRPr lang="en-US" dirty="0"/>
@@ -17652,7 +17639,7 @@
           <a:p>
             <a:r>
               <a:rPr lang="en-US" dirty="0"/>
-              <a:t>pySBOL3 Implements SBOL 3</a:t>
+              <a:t>pySBOL3 Implements SBOL3</a:t>
             </a:r>
           </a:p>
         </p:txBody>

</xml_diff>

<commit_message>
Add slides for Tyto and SBOL-utilities
</commit_message>
<xml_diff>
--- a/2022/IWBDA22/sbol3-workshop/pySBOL3-IWBDA-2022.pptx
+++ b/2022/IWBDA22/sbol3-workshop/pySBOL3-IWBDA-2022.pptx
@@ -8,10 +8,10 @@
     <p:sldMasterId id="2147483672" r:id="rId6"/>
   </p:sldMasterIdLst>
   <p:notesMasterIdLst>
-    <p:notesMasterId r:id="rId21"/>
+    <p:notesMasterId r:id="rId23"/>
   </p:notesMasterIdLst>
   <p:handoutMasterIdLst>
-    <p:handoutMasterId r:id="rId22"/>
+    <p:handoutMasterId r:id="rId24"/>
   </p:handoutMasterIdLst>
   <p:sldIdLst>
     <p:sldId id="325" r:id="rId7"/>
@@ -26,8 +26,10 @@
     <p:sldId id="337" r:id="rId16"/>
     <p:sldId id="338" r:id="rId17"/>
     <p:sldId id="339" r:id="rId18"/>
-    <p:sldId id="285" r:id="rId19"/>
-    <p:sldId id="342" r:id="rId20"/>
+    <p:sldId id="343" r:id="rId19"/>
+    <p:sldId id="344" r:id="rId20"/>
+    <p:sldId id="285" r:id="rId21"/>
+    <p:sldId id="342" r:id="rId22"/>
   </p:sldIdLst>
   <p:sldSz cx="12192000" cy="6858000"/>
   <p:notesSz cx="6858000" cy="9144000"/>
@@ -1148,7 +1150,7 @@
           <a:p>
             <a:fld id="{5E1E3BB0-C8FD-40D9-9F39-577D7A163298}" type="slidenum">
               <a:rPr lang="en-US" smtClean="0"/>
-              <a:t>13</a:t>
+              <a:t>15</a:t>
             </a:fld>
             <a:endParaRPr lang="en-US"/>
           </a:p>
@@ -9306,14 +9308,14 @@
           </a:ln>
           <a:extLst>
             <a:ext uri="{909E8E84-426E-40dd-AFC4-6F175D3DCCD1}">
-              <a14:hiddenFill xmlns="" xmlns:a14="http://schemas.microsoft.com/office/drawing/2010/main">
+              <a14:hiddenFill xmlns:a14="http://schemas.microsoft.com/office/drawing/2010/main" xmlns="">
                 <a:solidFill>
                   <a:srgbClr val="FFFFFF"/>
                 </a:solidFill>
               </a14:hiddenFill>
             </a:ext>
             <a:ext uri="{91240B29-F687-4f45-9708-019B960494DF}">
-              <a14:hiddenLine xmlns="" xmlns:a14="http://schemas.microsoft.com/office/drawing/2010/main" w="9525">
+              <a14:hiddenLine xmlns:a14="http://schemas.microsoft.com/office/drawing/2010/main" xmlns="" w="9525">
                 <a:solidFill>
                   <a:srgbClr val="000000"/>
                 </a:solidFill>
@@ -9571,14 +9573,14 @@
           </a:ln>
           <a:extLst>
             <a:ext uri="{909E8E84-426E-40dd-AFC4-6F175D3DCCD1}">
-              <a14:hiddenFill xmlns="" xmlns:a14="http://schemas.microsoft.com/office/drawing/2010/main">
+              <a14:hiddenFill xmlns:a14="http://schemas.microsoft.com/office/drawing/2010/main" xmlns="">
                 <a:solidFill>
                   <a:srgbClr val="FFFFFF"/>
                 </a:solidFill>
               </a14:hiddenFill>
             </a:ext>
             <a:ext uri="{91240B29-F687-4f45-9708-019B960494DF}">
-              <a14:hiddenLine xmlns="" xmlns:a14="http://schemas.microsoft.com/office/drawing/2010/main" w="9525">
+              <a14:hiddenLine xmlns:a14="http://schemas.microsoft.com/office/drawing/2010/main" xmlns="" w="9525">
                 <a:solidFill>
                   <a:srgbClr val="000000"/>
                 </a:solidFill>
@@ -15740,6 +15742,459 @@
       </p:grpSpPr>
       <p:sp>
         <p:nvSpPr>
+          <p:cNvPr id="2" name="Text Placeholder 1">
+            <a:extLst>
+              <a:ext uri="{FF2B5EF4-FFF2-40B4-BE49-F238E27FC236}">
+                <a16:creationId xmlns:a16="http://schemas.microsoft.com/office/drawing/2014/main" id="{F6DEC37F-C33C-003A-8843-1CC7FFEE01FC}"/>
+              </a:ext>
+            </a:extLst>
+          </p:cNvPr>
+          <p:cNvSpPr>
+            <a:spLocks noGrp="1"/>
+          </p:cNvSpPr>
+          <p:nvPr>
+            <p:ph type="body" sz="quarter" idx="13"/>
+          </p:nvPr>
+        </p:nvSpPr>
+        <p:spPr>
+          <a:xfrm>
+            <a:off x="685799" y="1504401"/>
+            <a:ext cx="10829543" cy="4286799"/>
+          </a:xfrm>
+        </p:spPr>
+        <p:txBody>
+          <a:bodyPr/>
+          <a:lstStyle/>
+          <a:p>
+            <a:r>
+              <a:rPr lang="en-US" dirty="0"/>
+              <a:t>Tyto - </a:t>
+            </a:r>
+            <a:r>
+              <a:rPr lang="en-US" u="sng" dirty="0"/>
+              <a:t>T</a:t>
+            </a:r>
+            <a:r>
+              <a:rPr lang="en-US" dirty="0"/>
+              <a:t>ake </a:t>
+            </a:r>
+            <a:r>
+              <a:rPr lang="en-US" u="sng" dirty="0"/>
+              <a:t>Y</a:t>
+            </a:r>
+            <a:r>
+              <a:rPr lang="en-US" dirty="0"/>
+              <a:t>our </a:t>
+            </a:r>
+            <a:r>
+              <a:rPr lang="en-US" u="sng" dirty="0"/>
+              <a:t>T</a:t>
+            </a:r>
+            <a:r>
+              <a:rPr lang="en-US" dirty="0"/>
+              <a:t>erms from </a:t>
+            </a:r>
+            <a:r>
+              <a:rPr lang="en-US" u="sng" dirty="0"/>
+              <a:t>O</a:t>
+            </a:r>
+            <a:r>
+              <a:rPr lang="en-US" dirty="0"/>
+              <a:t>ntologies</a:t>
+            </a:r>
+          </a:p>
+          <a:p>
+            <a:pPr lvl="2"/>
+            <a:r>
+              <a:rPr lang="en-US" dirty="0"/>
+              <a:t>A more intuitive approach to using semantic web ontologies</a:t>
+            </a:r>
+          </a:p>
+          <a:p>
+            <a:pPr lvl="2"/>
+            <a:r>
+              <a:rPr lang="en-US" dirty="0"/>
+              <a:t>Generates symbols for URIs based on the ontology terms themselves</a:t>
+            </a:r>
+          </a:p>
+          <a:p>
+            <a:pPr lvl="2"/>
+            <a:r>
+              <a:rPr lang="en-US" dirty="0">
+                <a:hlinkClick r:id="rId2"/>
+              </a:rPr>
+              <a:t>https://github.com/SynBioDex/tyto</a:t>
+            </a:r>
+            <a:endParaRPr lang="en-US" dirty="0"/>
+          </a:p>
+          <a:p>
+            <a:pPr lvl="2"/>
+            <a:endParaRPr lang="en-US" dirty="0"/>
+          </a:p>
+        </p:txBody>
+      </p:sp>
+      <p:sp>
+        <p:nvSpPr>
+          <p:cNvPr id="4" name="Slide Number Placeholder 3">
+            <a:extLst>
+              <a:ext uri="{FF2B5EF4-FFF2-40B4-BE49-F238E27FC236}">
+                <a16:creationId xmlns:a16="http://schemas.microsoft.com/office/drawing/2014/main" id="{851A5B51-38ED-8AA5-7607-7C4669697D44}"/>
+              </a:ext>
+            </a:extLst>
+          </p:cNvPr>
+          <p:cNvSpPr>
+            <a:spLocks noGrp="1"/>
+          </p:cNvSpPr>
+          <p:nvPr>
+            <p:ph type="sldNum" sz="quarter" idx="4"/>
+          </p:nvPr>
+        </p:nvSpPr>
+        <p:spPr/>
+        <p:txBody>
+          <a:bodyPr/>
+          <a:lstStyle/>
+          <a:p>
+            <a:fld id="{07165E6F-54ED-4977-A15E-D44BE7238A65}" type="slidenum">
+              <a:rPr lang="en-US" smtClean="0"/>
+              <a:pPr/>
+              <a:t>13</a:t>
+            </a:fld>
+            <a:endParaRPr lang="en-US" dirty="0"/>
+          </a:p>
+        </p:txBody>
+      </p:sp>
+      <p:sp>
+        <p:nvSpPr>
+          <p:cNvPr id="5" name="Title 4">
+            <a:extLst>
+              <a:ext uri="{FF2B5EF4-FFF2-40B4-BE49-F238E27FC236}">
+                <a16:creationId xmlns:a16="http://schemas.microsoft.com/office/drawing/2014/main" id="{14F84AB8-DF87-EE7A-9FEB-EF1D65F1D91E}"/>
+              </a:ext>
+            </a:extLst>
+          </p:cNvPr>
+          <p:cNvSpPr>
+            <a:spLocks noGrp="1"/>
+          </p:cNvSpPr>
+          <p:nvPr>
+            <p:ph type="title"/>
+          </p:nvPr>
+        </p:nvSpPr>
+        <p:spPr/>
+        <p:txBody>
+          <a:bodyPr/>
+          <a:lstStyle/>
+          <a:p>
+            <a:r>
+              <a:rPr lang="en-US" dirty="0"/>
+              <a:t>Related Tools: Tyto</a:t>
+            </a:r>
+          </a:p>
+        </p:txBody>
+      </p:sp>
+      <p:pic>
+        <p:nvPicPr>
+          <p:cNvPr id="8" name="Picture 7">
+            <a:extLst>
+              <a:ext uri="{FF2B5EF4-FFF2-40B4-BE49-F238E27FC236}">
+                <a16:creationId xmlns:a16="http://schemas.microsoft.com/office/drawing/2014/main" id="{02F66A34-A506-D248-14C6-1087C49F290F}"/>
+              </a:ext>
+            </a:extLst>
+          </p:cNvPr>
+          <p:cNvPicPr>
+            <a:picLocks noChangeAspect="1"/>
+          </p:cNvPicPr>
+          <p:nvPr/>
+        </p:nvPicPr>
+        <p:blipFill>
+          <a:blip r:embed="rId3"/>
+          <a:stretch>
+            <a:fillRect/>
+          </a:stretch>
+        </p:blipFill>
+        <p:spPr>
+          <a:xfrm>
+            <a:off x="2593427" y="3759375"/>
+            <a:ext cx="6858000" cy="1587500"/>
+          </a:xfrm>
+          <a:prstGeom prst="rect">
+            <a:avLst/>
+          </a:prstGeom>
+          <a:ln w="38100" cap="sq">
+            <a:solidFill>
+              <a:srgbClr val="000000"/>
+            </a:solidFill>
+            <a:prstDash val="solid"/>
+            <a:miter lim="800000"/>
+          </a:ln>
+          <a:effectLst>
+            <a:outerShdw blurRad="50800" dist="38100" dir="2700000" algn="tl" rotWithShape="0">
+              <a:srgbClr val="000000">
+                <a:alpha val="43000"/>
+              </a:srgbClr>
+            </a:outerShdw>
+          </a:effectLst>
+        </p:spPr>
+      </p:pic>
+    </p:spTree>
+    <p:extLst>
+      <p:ext uri="{BB962C8B-B14F-4D97-AF65-F5344CB8AC3E}">
+        <p14:creationId xmlns:p14="http://schemas.microsoft.com/office/powerpoint/2010/main" val="1905904483"/>
+      </p:ext>
+    </p:extLst>
+  </p:cSld>
+  <p:clrMapOvr>
+    <a:masterClrMapping/>
+  </p:clrMapOvr>
+  <mc:AlternateContent xmlns:mc="http://schemas.openxmlformats.org/markup-compatibility/2006" xmlns:p14="http://schemas.microsoft.com/office/powerpoint/2010/main">
+    <mc:Choice Requires="p14">
+      <p:transition spd="med" p14:dur="700">
+        <p:fade/>
+      </p:transition>
+    </mc:Choice>
+    <mc:Fallback xmlns="">
+      <p:transition spd="med">
+        <p:fade/>
+      </p:transition>
+    </mc:Fallback>
+  </mc:AlternateContent>
+</p:sld>
+</file>
+
+<file path=ppt/slides/slide14.xml><?xml version="1.0" encoding="utf-8"?>
+<p:sld xmlns:a="http://schemas.openxmlformats.org/drawingml/2006/main" xmlns:r="http://schemas.openxmlformats.org/officeDocument/2006/relationships" xmlns:p="http://schemas.openxmlformats.org/presentationml/2006/main">
+  <p:cSld>
+    <p:spTree>
+      <p:nvGrpSpPr>
+        <p:cNvPr id="1" name=""/>
+        <p:cNvGrpSpPr/>
+        <p:nvPr/>
+      </p:nvGrpSpPr>
+      <p:grpSpPr>
+        <a:xfrm>
+          <a:off x="0" y="0"/>
+          <a:ext cx="0" cy="0"/>
+          <a:chOff x="0" y="0"/>
+          <a:chExt cx="0" cy="0"/>
+        </a:xfrm>
+      </p:grpSpPr>
+      <p:sp>
+        <p:nvSpPr>
+          <p:cNvPr id="2" name="Text Placeholder 1">
+            <a:extLst>
+              <a:ext uri="{FF2B5EF4-FFF2-40B4-BE49-F238E27FC236}">
+                <a16:creationId xmlns:a16="http://schemas.microsoft.com/office/drawing/2014/main" id="{F6DEC37F-C33C-003A-8843-1CC7FFEE01FC}"/>
+              </a:ext>
+            </a:extLst>
+          </p:cNvPr>
+          <p:cNvSpPr>
+            <a:spLocks noGrp="1"/>
+          </p:cNvSpPr>
+          <p:nvPr>
+            <p:ph type="body" sz="quarter" idx="13"/>
+          </p:nvPr>
+        </p:nvSpPr>
+        <p:spPr>
+          <a:xfrm>
+            <a:off x="685799" y="1504401"/>
+            <a:ext cx="10829543" cy="4286799"/>
+          </a:xfrm>
+        </p:spPr>
+        <p:txBody>
+          <a:bodyPr/>
+          <a:lstStyle/>
+          <a:p>
+            <a:r>
+              <a:rPr lang="en-US" dirty="0"/>
+              <a:t>SBOL-utilities</a:t>
+            </a:r>
+          </a:p>
+          <a:p>
+            <a:pPr lvl="2"/>
+            <a:r>
+              <a:rPr lang="en-US" dirty="0"/>
+              <a:t>A collection of scripts and functions for manipulating SBOL 3 data</a:t>
+            </a:r>
+          </a:p>
+          <a:p>
+            <a:pPr lvl="2"/>
+            <a:r>
+              <a:rPr lang="en-US" dirty="0"/>
+              <a:t>Layers on top of pySBOL3 and provides higher level functionality</a:t>
+            </a:r>
+          </a:p>
+          <a:p>
+            <a:pPr lvl="2"/>
+            <a:r>
+              <a:rPr lang="en-US" dirty="0"/>
+              <a:t>Capabilities:</a:t>
+            </a:r>
+          </a:p>
+          <a:p>
+            <a:pPr lvl="4"/>
+            <a:r>
+              <a:rPr lang="en-US" dirty="0"/>
+              <a:t>Graph SBOL Documents</a:t>
+            </a:r>
+          </a:p>
+          <a:p>
+            <a:pPr lvl="4"/>
+            <a:r>
+              <a:rPr lang="en-US" dirty="0"/>
+              <a:t>Convert an Excel template file to SBOL</a:t>
+            </a:r>
+          </a:p>
+          <a:p>
+            <a:pPr lvl="4"/>
+            <a:r>
+              <a:rPr lang="en-US" dirty="0"/>
+              <a:t>Convert </a:t>
+            </a:r>
+            <a:r>
+              <a:rPr lang="en-US" dirty="0" err="1"/>
+              <a:t>beween</a:t>
+            </a:r>
+            <a:r>
+              <a:rPr lang="en-US" dirty="0"/>
+              <a:t> SBOL3 and other genetic design formats</a:t>
+            </a:r>
+          </a:p>
+          <a:p>
+            <a:pPr lvl="4"/>
+            <a:r>
+              <a:rPr lang="en-US"/>
+              <a:t>Expand the combinatorial derivations in an SBOL file</a:t>
+            </a:r>
+            <a:endParaRPr lang="en-US" dirty="0"/>
+          </a:p>
+          <a:p>
+            <a:pPr lvl="4"/>
+            <a:r>
+              <a:rPr lang="en-US" dirty="0"/>
+              <a:t>And more…</a:t>
+            </a:r>
+          </a:p>
+          <a:p>
+            <a:pPr lvl="2"/>
+            <a:r>
+              <a:rPr lang="en-US" dirty="0">
+                <a:hlinkClick r:id="rId2"/>
+              </a:rPr>
+              <a:t>https://github.com/synbiodex/sbol-utilities</a:t>
+            </a:r>
+            <a:endParaRPr lang="en-US" dirty="0"/>
+          </a:p>
+          <a:p>
+            <a:pPr lvl="2"/>
+            <a:endParaRPr lang="en-US" dirty="0"/>
+          </a:p>
+          <a:p>
+            <a:pPr lvl="2"/>
+            <a:endParaRPr lang="en-US" dirty="0"/>
+          </a:p>
+        </p:txBody>
+      </p:sp>
+      <p:sp>
+        <p:nvSpPr>
+          <p:cNvPr id="4" name="Slide Number Placeholder 3">
+            <a:extLst>
+              <a:ext uri="{FF2B5EF4-FFF2-40B4-BE49-F238E27FC236}">
+                <a16:creationId xmlns:a16="http://schemas.microsoft.com/office/drawing/2014/main" id="{851A5B51-38ED-8AA5-7607-7C4669697D44}"/>
+              </a:ext>
+            </a:extLst>
+          </p:cNvPr>
+          <p:cNvSpPr>
+            <a:spLocks noGrp="1"/>
+          </p:cNvSpPr>
+          <p:nvPr>
+            <p:ph type="sldNum" sz="quarter" idx="4"/>
+          </p:nvPr>
+        </p:nvSpPr>
+        <p:spPr/>
+        <p:txBody>
+          <a:bodyPr/>
+          <a:lstStyle/>
+          <a:p>
+            <a:fld id="{07165E6F-54ED-4977-A15E-D44BE7238A65}" type="slidenum">
+              <a:rPr lang="en-US" smtClean="0"/>
+              <a:pPr/>
+              <a:t>14</a:t>
+            </a:fld>
+            <a:endParaRPr lang="en-US" dirty="0"/>
+          </a:p>
+        </p:txBody>
+      </p:sp>
+      <p:sp>
+        <p:nvSpPr>
+          <p:cNvPr id="5" name="Title 4">
+            <a:extLst>
+              <a:ext uri="{FF2B5EF4-FFF2-40B4-BE49-F238E27FC236}">
+                <a16:creationId xmlns:a16="http://schemas.microsoft.com/office/drawing/2014/main" id="{14F84AB8-DF87-EE7A-9FEB-EF1D65F1D91E}"/>
+              </a:ext>
+            </a:extLst>
+          </p:cNvPr>
+          <p:cNvSpPr>
+            <a:spLocks noGrp="1"/>
+          </p:cNvSpPr>
+          <p:nvPr>
+            <p:ph type="title"/>
+          </p:nvPr>
+        </p:nvSpPr>
+        <p:spPr/>
+        <p:txBody>
+          <a:bodyPr/>
+          <a:lstStyle/>
+          <a:p>
+            <a:r>
+              <a:rPr lang="en-US" dirty="0"/>
+              <a:t>Related Tools: SBOL-utilities</a:t>
+            </a:r>
+          </a:p>
+        </p:txBody>
+      </p:sp>
+    </p:spTree>
+    <p:extLst>
+      <p:ext uri="{BB962C8B-B14F-4D97-AF65-F5344CB8AC3E}">
+        <p14:creationId xmlns:p14="http://schemas.microsoft.com/office/powerpoint/2010/main" val="3695602577"/>
+      </p:ext>
+    </p:extLst>
+  </p:cSld>
+  <p:clrMapOvr>
+    <a:masterClrMapping/>
+  </p:clrMapOvr>
+  <mc:AlternateContent xmlns:mc="http://schemas.openxmlformats.org/markup-compatibility/2006">
+    <mc:Choice xmlns:p14="http://schemas.microsoft.com/office/powerpoint/2010/main" Requires="p14">
+      <p:transition spd="med" p14:dur="700">
+        <p:fade/>
+      </p:transition>
+    </mc:Choice>
+    <mc:Fallback>
+      <p:transition spd="med">
+        <p:fade/>
+      </p:transition>
+    </mc:Fallback>
+  </mc:AlternateContent>
+</p:sld>
+</file>
+
+<file path=ppt/slides/slide15.xml><?xml version="1.0" encoding="utf-8"?>
+<p:sld xmlns:a="http://schemas.openxmlformats.org/drawingml/2006/main" xmlns:r="http://schemas.openxmlformats.org/officeDocument/2006/relationships" xmlns:p="http://schemas.openxmlformats.org/presentationml/2006/main">
+  <p:cSld>
+    <p:spTree>
+      <p:nvGrpSpPr>
+        <p:cNvPr id="1" name=""/>
+        <p:cNvGrpSpPr/>
+        <p:nvPr/>
+      </p:nvGrpSpPr>
+      <p:grpSpPr>
+        <a:xfrm>
+          <a:off x="0" y="0"/>
+          <a:ext cx="0" cy="0"/>
+          <a:chOff x="0" y="0"/>
+          <a:chExt cx="0" cy="0"/>
+        </a:xfrm>
+      </p:grpSpPr>
+      <p:sp>
+        <p:nvSpPr>
           <p:cNvPr id="43" name="Picture Placeholder 42"/>
           <p:cNvSpPr>
             <a:spLocks noGrp="1"/>
@@ -15796,7 +16251,7 @@
             <a:fld id="{07165E6F-54ED-4977-A15E-D44BE7238A65}" type="slidenum">
               <a:rPr lang="en-US" smtClean="0"/>
               <a:pPr/>
-              <a:t>13</a:t>
+              <a:t>15</a:t>
             </a:fld>
             <a:endParaRPr lang="en-US" dirty="0"/>
           </a:p>
@@ -15823,7 +16278,7 @@
 </p:sld>
 </file>
 
-<file path=ppt/slides/slide14.xml><?xml version="1.0" encoding="utf-8"?>
+<file path=ppt/slides/slide16.xml><?xml version="1.0" encoding="utf-8"?>
 <p:sld xmlns:a="http://schemas.openxmlformats.org/drawingml/2006/main" xmlns:r="http://schemas.openxmlformats.org/officeDocument/2006/relationships" xmlns:p="http://schemas.openxmlformats.org/presentationml/2006/main">
   <p:cSld>
     <p:spTree>
@@ -15869,7 +16324,7 @@
             <a:fld id="{07165E6F-54ED-4977-A15E-D44BE7238A65}" type="slidenum">
               <a:rPr lang="en-US" smtClean="0"/>
               <a:pPr/>
-              <a:t>14</a:t>
+              <a:t>16</a:t>
             </a:fld>
             <a:endParaRPr lang="en-US" dirty="0"/>
           </a:p>
@@ -24183,19 +24638,19 @@
 </file>
 
 <file path=customXml/itemProps1.xml><?xml version="1.0" encoding="utf-8"?>
+<ds:datastoreItem xmlns:ds="http://schemas.openxmlformats.org/officeDocument/2006/customXml" ds:itemID="{D88A9972-54D5-4A46-9260-9FE1CB78EDF2}">
+  <ds:schemaRefs>
+    <ds:schemaRef ds:uri="http://www.w3.org/2001/XMLSchema"/>
+    <ds:schemaRef ds:uri="http://www.boldonjames.com/2008/01/sie/internal/label"/>
+  </ds:schemaRefs>
+</ds:datastoreItem>
+</file>
+
+<file path=customXml/itemProps2.xml><?xml version="1.0" encoding="utf-8"?>
 <ds:datastoreItem xmlns:ds="http://schemas.openxmlformats.org/officeDocument/2006/customXml" ds:itemID="{26C53044-EDCC-4767-9B64-ABCDF4BF539A}">
   <ds:schemaRefs>
     <ds:schemaRef ds:uri="http://www.w3.org/2001/XMLSchema"/>
     <ds:schemaRef ds:uri="http://www.boldonjames.com/2016/02/Classifier/internal/wrappedLabelHistory"/>
   </ds:schemaRefs>
 </ds:datastoreItem>
-</file>
-
-<file path=customXml/itemProps2.xml><?xml version="1.0" encoding="utf-8"?>
-<ds:datastoreItem xmlns:ds="http://schemas.openxmlformats.org/officeDocument/2006/customXml" ds:itemID="{D88A9972-54D5-4A46-9260-9FE1CB78EDF2}">
-  <ds:schemaRefs>
-    <ds:schemaRef ds:uri="http://www.w3.org/2001/XMLSchema"/>
-    <ds:schemaRef ds:uri="http://www.boldonjames.com/2008/01/sie/internal/label"/>
-  </ds:schemaRefs>
-</ds:datastoreItem>
 </file>
</xml_diff>